<commit_message>
Another grammar and continuity pass through paper
</commit_message>
<xml_diff>
--- a/papers/RSS2016/pictures/pdf/5diagramsplots.pptx
+++ b/papers/RSS2016/pictures/pdf/5diagramsplots.pptx
@@ -208,7 +208,7 @@
           <a:p>
             <a:fld id="{1102A40C-9752-495E-9814-EDB0A74B5D72}" type="datetimeFigureOut">
               <a:rPr lang="en-US" smtClean="0"/>
-              <a:t>1/28/16</a:t>
+              <a:t>1/28/2016</a:t>
             </a:fld>
             <a:endParaRPr lang="en-US"/>
           </a:p>
@@ -695,7 +695,7 @@
           <a:p>
             <a:fld id="{3C9584D4-1EC3-4110-8184-CD57BE378914}" type="datetimeFigureOut">
               <a:rPr lang="en-US" smtClean="0"/>
-              <a:t>1/28/16</a:t>
+              <a:t>1/28/2016</a:t>
             </a:fld>
             <a:endParaRPr lang="en-US"/>
           </a:p>
@@ -865,7 +865,7 @@
           <a:p>
             <a:fld id="{3C9584D4-1EC3-4110-8184-CD57BE378914}" type="datetimeFigureOut">
               <a:rPr lang="en-US" smtClean="0"/>
-              <a:t>1/28/16</a:t>
+              <a:t>1/28/2016</a:t>
             </a:fld>
             <a:endParaRPr lang="en-US"/>
           </a:p>
@@ -1045,7 +1045,7 @@
           <a:p>
             <a:fld id="{3C9584D4-1EC3-4110-8184-CD57BE378914}" type="datetimeFigureOut">
               <a:rPr lang="en-US" smtClean="0"/>
-              <a:t>1/28/16</a:t>
+              <a:t>1/28/2016</a:t>
             </a:fld>
             <a:endParaRPr lang="en-US"/>
           </a:p>
@@ -1215,7 +1215,7 @@
           <a:p>
             <a:fld id="{3C9584D4-1EC3-4110-8184-CD57BE378914}" type="datetimeFigureOut">
               <a:rPr lang="en-US" smtClean="0"/>
-              <a:t>1/28/16</a:t>
+              <a:t>1/28/2016</a:t>
             </a:fld>
             <a:endParaRPr lang="en-US"/>
           </a:p>
@@ -1461,7 +1461,7 @@
           <a:p>
             <a:fld id="{3C9584D4-1EC3-4110-8184-CD57BE378914}" type="datetimeFigureOut">
               <a:rPr lang="en-US" smtClean="0"/>
-              <a:t>1/28/16</a:t>
+              <a:t>1/28/2016</a:t>
             </a:fld>
             <a:endParaRPr lang="en-US"/>
           </a:p>
@@ -1693,7 +1693,7 @@
           <a:p>
             <a:fld id="{3C9584D4-1EC3-4110-8184-CD57BE378914}" type="datetimeFigureOut">
               <a:rPr lang="en-US" smtClean="0"/>
-              <a:t>1/28/16</a:t>
+              <a:t>1/28/2016</a:t>
             </a:fld>
             <a:endParaRPr lang="en-US"/>
           </a:p>
@@ -2060,7 +2060,7 @@
           <a:p>
             <a:fld id="{3C9584D4-1EC3-4110-8184-CD57BE378914}" type="datetimeFigureOut">
               <a:rPr lang="en-US" smtClean="0"/>
-              <a:t>1/28/16</a:t>
+              <a:t>1/28/2016</a:t>
             </a:fld>
             <a:endParaRPr lang="en-US"/>
           </a:p>
@@ -2178,7 +2178,7 @@
           <a:p>
             <a:fld id="{3C9584D4-1EC3-4110-8184-CD57BE378914}" type="datetimeFigureOut">
               <a:rPr lang="en-US" smtClean="0"/>
-              <a:t>1/28/16</a:t>
+              <a:t>1/28/2016</a:t>
             </a:fld>
             <a:endParaRPr lang="en-US"/>
           </a:p>
@@ -2273,7 +2273,7 @@
           <a:p>
             <a:fld id="{3C9584D4-1EC3-4110-8184-CD57BE378914}" type="datetimeFigureOut">
               <a:rPr lang="en-US" smtClean="0"/>
-              <a:t>1/28/16</a:t>
+              <a:t>1/28/2016</a:t>
             </a:fld>
             <a:endParaRPr lang="en-US"/>
           </a:p>
@@ -2550,7 +2550,7 @@
           <a:p>
             <a:fld id="{3C9584D4-1EC3-4110-8184-CD57BE378914}" type="datetimeFigureOut">
               <a:rPr lang="en-US" smtClean="0"/>
-              <a:t>1/28/16</a:t>
+              <a:t>1/28/2016</a:t>
             </a:fld>
             <a:endParaRPr lang="en-US"/>
           </a:p>
@@ -2803,7 +2803,7 @@
           <a:p>
             <a:fld id="{3C9584D4-1EC3-4110-8184-CD57BE378914}" type="datetimeFigureOut">
               <a:rPr lang="en-US" smtClean="0"/>
-              <a:t>1/28/16</a:t>
+              <a:t>1/28/2016</a:t>
             </a:fld>
             <a:endParaRPr lang="en-US"/>
           </a:p>
@@ -3016,7 +3016,7 @@
           <a:p>
             <a:fld id="{3C9584D4-1EC3-4110-8184-CD57BE378914}" type="datetimeFigureOut">
               <a:rPr lang="en-US" smtClean="0"/>
-              <a:t>1/28/16</a:t>
+              <a:t>1/28/2016</a:t>
             </a:fld>
             <a:endParaRPr lang="en-US"/>
           </a:p>
@@ -3423,7 +3423,7 @@
       </p:grpSpPr>
       <p:pic>
         <p:nvPicPr>
-          <p:cNvPr id="1028" name="Picture 4"/>
+          <p:cNvPr id="1026" name="Picture 2"/>
           <p:cNvPicPr>
             <a:picLocks noChangeAspect="1" noChangeArrowheads="1"/>
           </p:cNvPicPr>
@@ -3437,13 +3437,13 @@
               </a:ext>
             </a:extLst>
           </a:blip>
-          <a:srcRect l="11549" t="9970" r="40292" b="43167"/>
+          <a:srcRect l="9999" t="9640" b="44839"/>
           <a:stretch/>
         </p:blipFill>
         <p:spPr bwMode="auto">
           <a:xfrm>
-            <a:off x="1346806" y="194317"/>
-            <a:ext cx="9396567" cy="4361702"/>
+            <a:off x="1639194" y="32680"/>
+            <a:ext cx="15937203" cy="4534240"/>
           </a:xfrm>
           <a:prstGeom prst="rect">
             <a:avLst/>
@@ -3453,14 +3453,14 @@
             <a:noFill/>
           </a:ln>
           <a:extLst>
-            <a:ext uri="{909E8E84-426E-40dd-AFC4-6F175D3DCCD1}">
+            <a:ext uri="{909E8E84-426E-40DD-AFC4-6F175D3DCCD1}">
               <a14:hiddenFill xmlns:a14="http://schemas.microsoft.com/office/drawing/2010/main">
                 <a:solidFill>
                   <a:schemeClr val="accent1"/>
                 </a:solidFill>
               </a14:hiddenFill>
             </a:ext>
-            <a:ext uri="{91240B29-F687-4f45-9708-019B960494DF}">
+            <a:ext uri="{91240B29-F687-4F45-9708-019B960494DF}">
               <a14:hiddenLine xmlns:a14="http://schemas.microsoft.com/office/drawing/2010/main" w="9525">
                 <a:solidFill>
                   <a:schemeClr val="tx1"/>
@@ -3485,7 +3485,7 @@
         </p:nvSpPr>
         <p:spPr>
           <a:xfrm>
-            <a:off x="4828861" y="4357158"/>
+            <a:off x="5089389" y="4357158"/>
             <a:ext cx="3599643" cy="535531"/>
           </a:xfrm>
           <a:prstGeom prst="rect">
@@ -3538,7 +3538,7 @@
         </p:blipFill>
         <p:spPr>
           <a:xfrm>
-            <a:off x="9276801" y="4945929"/>
+            <a:off x="8397504" y="4945929"/>
             <a:ext cx="1114931" cy="1446446"/>
           </a:xfrm>
           <a:prstGeom prst="rect">
@@ -3554,7 +3554,7 @@
         </p:nvSpPr>
         <p:spPr>
           <a:xfrm rot="5400000">
-            <a:off x="5656787" y="6520159"/>
+            <a:off x="6487220" y="6520159"/>
             <a:ext cx="222009" cy="187034"/>
           </a:xfrm>
           <a:prstGeom prst="triangle">
@@ -3600,7 +3600,7 @@
         </p:nvSpPr>
         <p:spPr>
           <a:xfrm>
-            <a:off x="3394037" y="6569854"/>
+            <a:off x="4143055" y="6569854"/>
             <a:ext cx="130990" cy="124530"/>
           </a:xfrm>
           <a:prstGeom prst="ellipse">
@@ -3646,7 +3646,7 @@
         </p:nvSpPr>
         <p:spPr>
           <a:xfrm>
-            <a:off x="2082332" y="6569854"/>
+            <a:off x="2652237" y="6569854"/>
             <a:ext cx="125243" cy="154825"/>
           </a:xfrm>
           <a:prstGeom prst="diamond">
@@ -3702,7 +3702,7 @@
         </p:blipFill>
         <p:spPr>
           <a:xfrm>
-            <a:off x="1668247" y="4950951"/>
+            <a:off x="2238152" y="4950951"/>
             <a:ext cx="953414" cy="1446944"/>
           </a:xfrm>
           <a:prstGeom prst="rect">
@@ -3725,7 +3725,7 @@
         </p:blipFill>
         <p:spPr>
           <a:xfrm>
-            <a:off x="2878384" y="4945430"/>
+            <a:off x="3627402" y="4945430"/>
             <a:ext cx="1171640" cy="1446944"/>
           </a:xfrm>
           <a:prstGeom prst="rect">
@@ -3748,7 +3748,7 @@
         </p:blipFill>
         <p:spPr>
           <a:xfrm>
-            <a:off x="4410978" y="4939908"/>
+            <a:off x="5241411" y="4939908"/>
             <a:ext cx="2722401" cy="1452466"/>
           </a:xfrm>
           <a:prstGeom prst="rect">
@@ -3838,8 +3838,8 @@
           <p:nvPr/>
         </p:nvSpPr>
         <p:spPr>
-          <a:xfrm rot="20141341">
-            <a:off x="3881147" y="1547793"/>
+          <a:xfrm rot="20073914">
+            <a:off x="4151613" y="531365"/>
             <a:ext cx="8165331" cy="486415"/>
           </a:xfrm>
           <a:prstGeom prst="rect">
@@ -3898,7 +3898,7 @@
         </p:blipFill>
         <p:spPr>
           <a:xfrm>
-            <a:off x="7571192" y="5004008"/>
+            <a:off x="10013657" y="5036568"/>
             <a:ext cx="1459432" cy="1355805"/>
           </a:xfrm>
           <a:prstGeom prst="rect">
@@ -3914,7 +3914,7 @@
         </p:nvSpPr>
         <p:spPr>
           <a:xfrm>
-            <a:off x="9809858" y="6502670"/>
+            <a:off x="10640291" y="6502670"/>
             <a:ext cx="187036" cy="191713"/>
           </a:xfrm>
           <a:prstGeom prst="triangle">
@@ -3957,7 +3957,7 @@
         </p:nvSpPr>
         <p:spPr>
           <a:xfrm rot="10800000">
-            <a:off x="8091973" y="6502671"/>
+            <a:off x="8922406" y="6502671"/>
             <a:ext cx="215683" cy="191713"/>
           </a:xfrm>
           <a:prstGeom prst="triangle">
@@ -4005,7 +4005,7 @@
   <p:timing>
     <p:tnLst>
       <p:par>
-        <p:cTn xmlns:p14="http://schemas.microsoft.com/office/powerpoint/2010/main" id="1" dur="indefinite" restart="never" nodeType="tmRoot"/>
+        <p:cTn id="1" dur="indefinite" restart="never" nodeType="tmRoot"/>
       </p:par>
     </p:tnLst>
   </p:timing>
@@ -4055,7 +4055,7 @@
     </a:clrScheme>
     <a:fontScheme name="Office">
       <a:majorFont>
-        <a:latin typeface="Calibri Light"/>
+        <a:latin typeface="Calibri Light" panose="020F0302020204030204"/>
         <a:ea typeface=""/>
         <a:cs typeface=""/>
         <a:font script="Jpan" typeface="ＭＳ Ｐゴシック"/>
@@ -4090,7 +4090,7 @@
         <a:font script="Geor" typeface="Sylfaen"/>
       </a:majorFont>
       <a:minorFont>
-        <a:latin typeface="Calibri"/>
+        <a:latin typeface="Calibri" panose="020F0502020204030204"/>
         <a:ea typeface=""/>
         <a:cs typeface=""/>
         <a:font script="Jpan" typeface="ＭＳ Ｐゴシック"/>
@@ -4316,7 +4316,7 @@
     </a:clrScheme>
     <a:fontScheme name="Office">
       <a:majorFont>
-        <a:latin typeface="Calibri Light"/>
+        <a:latin typeface="Calibri Light" panose="020F0302020204030204"/>
         <a:ea typeface=""/>
         <a:cs typeface=""/>
         <a:font script="Jpan" typeface="ＭＳ Ｐゴシック"/>
@@ -4351,7 +4351,7 @@
         <a:font script="Geor" typeface="Sylfaen"/>
       </a:majorFont>
       <a:minorFont>
-        <a:latin typeface="Calibri"/>
+        <a:latin typeface="Calibri" panose="020F0502020204030204"/>
         <a:ea typeface=""/>
         <a:cs typeface=""/>
         <a:font script="Jpan" typeface="ＭＳ Ｐゴシック"/>

</xml_diff>